<commit_message>
Adding final evaluation of best performing model
</commit_message>
<xml_diff>
--- a/Clothing_sales_timeseries/Clothing_sales_timeseries_forecasting.pptx
+++ b/Clothing_sales_timeseries/Clothing_sales_timeseries_forecasting.pptx
@@ -204,7 +204,7 @@
           <a:p>
             <a:fld id="{7D1BD353-0E3F-4F7F-B2DA-DDB1E24F65DD}" type="datetimeFigureOut">
               <a:rPr lang="en-US" smtClean="0"/>
-              <a:t>6/15/2025</a:t>
+              <a:t>6/24/2025</a:t>
             </a:fld>
             <a:endParaRPr lang="en-US"/>
           </a:p>
@@ -1140,7 +1140,7 @@
           <a:p>
             <a:fld id="{8C737111-AB33-4E78-99FF-07CB70C4A694}" type="datetimeFigureOut">
               <a:rPr lang="en-US" smtClean="0"/>
-              <a:t>6/15/2025</a:t>
+              <a:t>6/24/2025</a:t>
             </a:fld>
             <a:endParaRPr lang="en-US"/>
           </a:p>
@@ -1338,7 +1338,7 @@
           <a:p>
             <a:fld id="{8C737111-AB33-4E78-99FF-07CB70C4A694}" type="datetimeFigureOut">
               <a:rPr lang="en-US" smtClean="0"/>
-              <a:t>6/15/2025</a:t>
+              <a:t>6/24/2025</a:t>
             </a:fld>
             <a:endParaRPr lang="en-US"/>
           </a:p>
@@ -1546,7 +1546,7 @@
           <a:p>
             <a:fld id="{8C737111-AB33-4E78-99FF-07CB70C4A694}" type="datetimeFigureOut">
               <a:rPr lang="en-US" smtClean="0"/>
-              <a:t>6/15/2025</a:t>
+              <a:t>6/24/2025</a:t>
             </a:fld>
             <a:endParaRPr lang="en-US"/>
           </a:p>
@@ -1744,7 +1744,7 @@
           <a:p>
             <a:fld id="{8C737111-AB33-4E78-99FF-07CB70C4A694}" type="datetimeFigureOut">
               <a:rPr lang="en-US" smtClean="0"/>
-              <a:t>6/15/2025</a:t>
+              <a:t>6/24/2025</a:t>
             </a:fld>
             <a:endParaRPr lang="en-US"/>
           </a:p>
@@ -2019,7 +2019,7 @@
           <a:p>
             <a:fld id="{8C737111-AB33-4E78-99FF-07CB70C4A694}" type="datetimeFigureOut">
               <a:rPr lang="en-US" smtClean="0"/>
-              <a:t>6/15/2025</a:t>
+              <a:t>6/24/2025</a:t>
             </a:fld>
             <a:endParaRPr lang="en-US"/>
           </a:p>
@@ -2284,7 +2284,7 @@
           <a:p>
             <a:fld id="{8C737111-AB33-4E78-99FF-07CB70C4A694}" type="datetimeFigureOut">
               <a:rPr lang="en-US" smtClean="0"/>
-              <a:t>6/15/2025</a:t>
+              <a:t>6/24/2025</a:t>
             </a:fld>
             <a:endParaRPr lang="en-US"/>
           </a:p>
@@ -2696,7 +2696,7 @@
           <a:p>
             <a:fld id="{8C737111-AB33-4E78-99FF-07CB70C4A694}" type="datetimeFigureOut">
               <a:rPr lang="en-US" smtClean="0"/>
-              <a:t>6/15/2025</a:t>
+              <a:t>6/24/2025</a:t>
             </a:fld>
             <a:endParaRPr lang="en-US"/>
           </a:p>
@@ -2837,7 +2837,7 @@
           <a:p>
             <a:fld id="{8C737111-AB33-4E78-99FF-07CB70C4A694}" type="datetimeFigureOut">
               <a:rPr lang="en-US" smtClean="0"/>
-              <a:t>6/15/2025</a:t>
+              <a:t>6/24/2025</a:t>
             </a:fld>
             <a:endParaRPr lang="en-US"/>
           </a:p>
@@ -2950,7 +2950,7 @@
           <a:p>
             <a:fld id="{8C737111-AB33-4E78-99FF-07CB70C4A694}" type="datetimeFigureOut">
               <a:rPr lang="en-US" smtClean="0"/>
-              <a:t>6/15/2025</a:t>
+              <a:t>6/24/2025</a:t>
             </a:fld>
             <a:endParaRPr lang="en-US"/>
           </a:p>
@@ -3261,7 +3261,7 @@
           <a:p>
             <a:fld id="{8C737111-AB33-4E78-99FF-07CB70C4A694}" type="datetimeFigureOut">
               <a:rPr lang="en-US" smtClean="0"/>
-              <a:t>6/15/2025</a:t>
+              <a:t>6/24/2025</a:t>
             </a:fld>
             <a:endParaRPr lang="en-US"/>
           </a:p>
@@ -3549,7 +3549,7 @@
           <a:p>
             <a:fld id="{8C737111-AB33-4E78-99FF-07CB70C4A694}" type="datetimeFigureOut">
               <a:rPr lang="en-US" smtClean="0"/>
-              <a:t>6/15/2025</a:t>
+              <a:t>6/24/2025</a:t>
             </a:fld>
             <a:endParaRPr lang="en-US"/>
           </a:p>
@@ -3790,7 +3790,7 @@
           <a:p>
             <a:fld id="{8C737111-AB33-4E78-99FF-07CB70C4A694}" type="datetimeFigureOut">
               <a:rPr lang="en-US" smtClean="0"/>
-              <a:t>6/15/2025</a:t>
+              <a:t>6/24/2025</a:t>
             </a:fld>
             <a:endParaRPr lang="en-US"/>
           </a:p>
@@ -5594,7 +5594,7 @@
           </p:nvSpPr>
           <p:spPr>
             <a:xfrm>
-              <a:off x="6404193" y="1072764"/>
+              <a:off x="6451841" y="936779"/>
               <a:ext cx="2073684" cy="1200329"/>
             </a:xfrm>
             <a:prstGeom prst="rect">
@@ -5662,8 +5662,8 @@
           </p:nvSpPr>
           <p:spPr>
             <a:xfrm>
-              <a:off x="6449435" y="2141553"/>
-              <a:ext cx="2073684" cy="646331"/>
+              <a:off x="5919366" y="1788832"/>
+              <a:ext cx="2850709" cy="923330"/>
             </a:xfrm>
             <a:prstGeom prst="rect">
               <a:avLst/>
@@ -5681,7 +5681,7 @@
                   <a:latin typeface="Calibri" panose="020F0502020204030204" pitchFamily="34" charset="0"/>
                   <a:cs typeface="Calibri" panose="020F0502020204030204" pitchFamily="34" charset="0"/>
                 </a:rPr>
-                <a:t>Split 70:30 and scale to [0,1]</a:t>
+                <a:t>Save last 50 entries for best model eval. Split remaining 70:30 and scale to [0,1]</a:t>
               </a:r>
             </a:p>
           </p:txBody>
@@ -6216,10 +6216,10 @@
       </p:grpSpPr>
       <p:pic>
         <p:nvPicPr>
-          <p:cNvPr id="29" name="Picture 28" descr="A graph of a line graph&#10;&#10;AI-generated content may be incorrect.">
-            <a:extLst>
-              <a:ext uri="{FF2B5EF4-FFF2-40B4-BE49-F238E27FC236}">
-                <a16:creationId xmlns:a16="http://schemas.microsoft.com/office/drawing/2014/main" id="{33CF8E74-9738-0948-C826-04CB2FE44744}"/>
+          <p:cNvPr id="10" name="Picture 9" descr="A graph with blue and orange lines&#10;&#10;AI-generated content may be incorrect.">
+            <a:extLst>
+              <a:ext uri="{FF2B5EF4-FFF2-40B4-BE49-F238E27FC236}">
+                <a16:creationId xmlns:a16="http://schemas.microsoft.com/office/drawing/2014/main" id="{B4EF7416-AA2E-0A34-8DEE-39697025EE1E}"/>
               </a:ext>
             </a:extLst>
           </p:cNvPr>
@@ -6236,13 +6236,14 @@
               </a:ext>
             </a:extLst>
           </a:blip>
-          <a:srcRect t="5950"/>
-          <a:stretch/>
+          <a:stretch>
+            <a:fillRect/>
+          </a:stretch>
         </p:blipFill>
         <p:spPr>
           <a:xfrm>
-            <a:off x="0" y="2238375"/>
-            <a:ext cx="6096000" cy="3091227"/>
+            <a:off x="7475104" y="607382"/>
+            <a:ext cx="3625346" cy="2650031"/>
           </a:xfrm>
           <a:prstGeom prst="rect">
             <a:avLst/>
@@ -6251,10 +6252,10 @@
       </p:pic>
       <p:pic>
         <p:nvPicPr>
-          <p:cNvPr id="27" name="Picture 26" descr="A graph with blue and orange lines&#10;&#10;AI-generated content may be incorrect.">
-            <a:extLst>
-              <a:ext uri="{FF2B5EF4-FFF2-40B4-BE49-F238E27FC236}">
-                <a16:creationId xmlns:a16="http://schemas.microsoft.com/office/drawing/2014/main" id="{21101801-DF17-8BF8-5A36-535AE1F5E680}"/>
+          <p:cNvPr id="8" name="Picture 7" descr="A graph of a line graph&#10;&#10;AI-generated content may be incorrect.">
+            <a:extLst>
+              <a:ext uri="{FF2B5EF4-FFF2-40B4-BE49-F238E27FC236}">
+                <a16:creationId xmlns:a16="http://schemas.microsoft.com/office/drawing/2014/main" id="{4084833B-CE9D-96DE-4041-0A79F7849F0F}"/>
               </a:ext>
             </a:extLst>
           </p:cNvPr>
@@ -6271,14 +6272,13 @@
               </a:ext>
             </a:extLst>
           </a:blip>
-          <a:stretch>
-            <a:fillRect/>
-          </a:stretch>
+          <a:srcRect t="5618"/>
+          <a:stretch/>
         </p:blipFill>
         <p:spPr>
           <a:xfrm>
-            <a:off x="7065705" y="556259"/>
-            <a:ext cx="3577114" cy="2621107"/>
+            <a:off x="0" y="2228338"/>
+            <a:ext cx="6096000" cy="3102117"/>
           </a:xfrm>
           <a:prstGeom prst="rect">
             <a:avLst/>
@@ -6571,41 +6571,6 @@
           </a:p>
         </p:txBody>
       </p:sp>
-      <p:pic>
-        <p:nvPicPr>
-          <p:cNvPr id="31" name="Picture 30" descr="A graph showing the time of a forecast&#10;&#10;AI-generated content may be incorrect.">
-            <a:extLst>
-              <a:ext uri="{FF2B5EF4-FFF2-40B4-BE49-F238E27FC236}">
-                <a16:creationId xmlns:a16="http://schemas.microsoft.com/office/drawing/2014/main" id="{BBB88574-BD11-524F-E7E1-074A9886BC5C}"/>
-              </a:ext>
-            </a:extLst>
-          </p:cNvPr>
-          <p:cNvPicPr>
-            <a:picLocks noChangeAspect="1"/>
-          </p:cNvPicPr>
-          <p:nvPr/>
-        </p:nvPicPr>
-        <p:blipFill>
-          <a:blip r:embed="rId5">
-            <a:extLst>
-              <a:ext uri="{28A0092B-C50C-407E-A947-70E740481C1C}">
-                <a14:useLocalDpi xmlns:a14="http://schemas.microsoft.com/office/drawing/2010/main" val="0"/>
-              </a:ext>
-            </a:extLst>
-          </a:blip>
-          <a:srcRect t="5107"/>
-          <a:stretch/>
-        </p:blipFill>
-        <p:spPr>
-          <a:xfrm>
-            <a:off x="5748309" y="3593959"/>
-            <a:ext cx="6443691" cy="3233783"/>
-          </a:xfrm>
-          <a:prstGeom prst="rect">
-            <a:avLst/>
-          </a:prstGeom>
-        </p:spPr>
-      </p:pic>
       <p:sp>
         <p:nvSpPr>
           <p:cNvPr id="23" name="TextBox 22">
@@ -6641,6 +6606,42 @@
           </a:p>
         </p:txBody>
       </p:sp>
+      <p:pic>
+        <p:nvPicPr>
+          <p:cNvPr id="6" name="Picture 5" descr="A graph showing the time of a forecast&#10;&#10;AI-generated content may be incorrect.">
+            <a:extLst>
+              <a:ext uri="{FF2B5EF4-FFF2-40B4-BE49-F238E27FC236}">
+                <a16:creationId xmlns:a16="http://schemas.microsoft.com/office/drawing/2014/main" id="{CC432BD7-7D23-D2F2-F79C-7BE2ABDFB490}"/>
+              </a:ext>
+            </a:extLst>
+          </p:cNvPr>
+          <p:cNvPicPr>
+            <a:picLocks noChangeAspect="1"/>
+          </p:cNvPicPr>
+          <p:nvPr/>
+        </p:nvPicPr>
+        <p:blipFill>
+          <a:blip r:embed="rId5">
+            <a:extLst>
+              <a:ext uri="{28A0092B-C50C-407E-A947-70E740481C1C}">
+                <a14:useLocalDpi xmlns:a14="http://schemas.microsoft.com/office/drawing/2010/main" val="0"/>
+              </a:ext>
+            </a:extLst>
+          </a:blip>
+          <a:stretch>
+            <a:fillRect/>
+          </a:stretch>
+        </p:blipFill>
+        <p:spPr>
+          <a:xfrm>
+            <a:off x="5748309" y="3408382"/>
+            <a:ext cx="6443691" cy="3407794"/>
+          </a:xfrm>
+          <a:prstGeom prst="rect">
+            <a:avLst/>
+          </a:prstGeom>
+        </p:spPr>
+      </p:pic>
     </p:spTree>
     <p:extLst>
       <p:ext uri="{BB962C8B-B14F-4D97-AF65-F5344CB8AC3E}">
@@ -6673,10 +6674,10 @@
       </p:grpSpPr>
       <p:pic>
         <p:nvPicPr>
-          <p:cNvPr id="27" name="Picture 26" descr="A graph of a graph showing the time&#10;&#10;AI-generated content may be incorrect.">
-            <a:extLst>
-              <a:ext uri="{FF2B5EF4-FFF2-40B4-BE49-F238E27FC236}">
-                <a16:creationId xmlns:a16="http://schemas.microsoft.com/office/drawing/2014/main" id="{B8814EF9-F969-89C4-EE19-17E5F25655DA}"/>
+          <p:cNvPr id="7" name="Picture 6" descr="A graph showing a number of times&#10;&#10;AI-generated content may be incorrect.">
+            <a:extLst>
+              <a:ext uri="{FF2B5EF4-FFF2-40B4-BE49-F238E27FC236}">
+                <a16:creationId xmlns:a16="http://schemas.microsoft.com/office/drawing/2014/main" id="{8891D990-7139-8784-2E22-5E2B7CD5D398}"/>
               </a:ext>
             </a:extLst>
           </p:cNvPr>
@@ -6693,13 +6694,13 @@
               </a:ext>
             </a:extLst>
           </a:blip>
-          <a:srcRect t="5131"/>
+          <a:srcRect t="5840"/>
           <a:stretch/>
         </p:blipFill>
         <p:spPr>
           <a:xfrm>
-            <a:off x="51559" y="2707962"/>
-            <a:ext cx="5998484" cy="3068256"/>
+            <a:off x="46706" y="2707961"/>
+            <a:ext cx="5998485" cy="3045341"/>
           </a:xfrm>
           <a:prstGeom prst="rect">
             <a:avLst/>
@@ -6979,7 +6980,7 @@
         </p:nvSpPr>
         <p:spPr>
           <a:xfrm>
-            <a:off x="8859186" y="3716639"/>
+            <a:off x="8434980" y="3423375"/>
             <a:ext cx="3286108" cy="369332"/>
           </a:xfrm>
           <a:prstGeom prst="rect">
@@ -7215,8 +7216,8 @@
           </a:p>
         </p:txBody>
       </p:sp>
-      <mc:AlternateContent xmlns:mc="http://schemas.openxmlformats.org/markup-compatibility/2006" xmlns:a14="http://schemas.microsoft.com/office/drawing/2010/main">
-        <mc:Choice Requires="a14">
+      <mc:AlternateContent xmlns:mc="http://schemas.openxmlformats.org/markup-compatibility/2006">
+        <mc:Choice xmlns:a14="http://schemas.microsoft.com/office/drawing/2010/main" Requires="a14">
           <p:graphicFrame>
             <p:nvGraphicFramePr>
               <p:cNvPr id="4" name="Table 3">
@@ -7232,7 +7233,7 @@
               <p:nvPr>
                 <p:extLst>
                   <p:ext uri="{D42A27DB-BD31-4B8C-83A1-F6EECF244321}">
-                    <p14:modId xmlns:p14="http://schemas.microsoft.com/office/powerpoint/2010/main" val="671102739"/>
+                    <p14:modId xmlns:p14="http://schemas.microsoft.com/office/powerpoint/2010/main" val="1963289179"/>
                   </p:ext>
                 </p:extLst>
               </p:nvPr>
@@ -7398,7 +7399,7 @@
                         <a:p>
                           <a:r>
                             <a:rPr lang="en-US" dirty="0"/>
-                            <a:t>1172 (5.4% of mean value)</a:t>
+                            <a:t>1272.44 (5.82% of mean value)</a:t>
                           </a:r>
                         </a:p>
                       </a:txBody>
@@ -7411,7 +7412,7 @@
                         <a:p>
                           <a:r>
                             <a:rPr lang="en-US" dirty="0"/>
-                            <a:t>0.92</a:t>
+                            <a:t>0.91</a:t>
                           </a:r>
                         </a:p>
                       </a:txBody>
@@ -7444,7 +7445,7 @@
                         <a:p>
                           <a:r>
                             <a:rPr lang="en-US" dirty="0"/>
-                            <a:t>2212 (9.5% of mean value)</a:t>
+                            <a:t>1985.61 (10.51% of mean value)</a:t>
                           </a:r>
                         </a:p>
                       </a:txBody>
@@ -7457,7 +7458,7 @@
                         <a:p>
                           <a:r>
                             <a:rPr lang="en-US" dirty="0"/>
-                            <a:t>0.72</a:t>
+                            <a:t>0.70</a:t>
                           </a:r>
                         </a:p>
                       </a:txBody>
@@ -7474,7 +7475,7 @@
             </a:graphic>
           </p:graphicFrame>
         </mc:Choice>
-        <mc:Fallback xmlns="">
+        <mc:Fallback>
           <p:graphicFrame>
             <p:nvGraphicFramePr>
               <p:cNvPr id="4" name="Table 3">
@@ -7490,7 +7491,7 @@
               <p:nvPr>
                 <p:extLst>
                   <p:ext uri="{D42A27DB-BD31-4B8C-83A1-F6EECF244321}">
-                    <p14:modId xmlns:p14="http://schemas.microsoft.com/office/powerpoint/2010/main" val="671102739"/>
+                    <p14:modId xmlns:p14="http://schemas.microsoft.com/office/powerpoint/2010/main" val="1963289179"/>
                   </p:ext>
                 </p:extLst>
               </p:nvPr>
@@ -7628,7 +7629,7 @@
                         <a:p>
                           <a:r>
                             <a:rPr lang="en-US" dirty="0"/>
-                            <a:t>1172 (5.4% of mean value)</a:t>
+                            <a:t>1272.44 (5.82% of mean value)</a:t>
                           </a:r>
                         </a:p>
                       </a:txBody>
@@ -7641,7 +7642,7 @@
                         <a:p>
                           <a:r>
                             <a:rPr lang="en-US" dirty="0"/>
-                            <a:t>0.92</a:t>
+                            <a:t>0.91</a:t>
                           </a:r>
                         </a:p>
                       </a:txBody>
@@ -7674,7 +7675,7 @@
                         <a:p>
                           <a:r>
                             <a:rPr lang="en-US" dirty="0"/>
-                            <a:t>2212 (9.5% of mean value)</a:t>
+                            <a:t>1985.61 (10.51% of mean value)</a:t>
                           </a:r>
                         </a:p>
                       </a:txBody>
@@ -7687,7 +7688,7 @@
                         <a:p>
                           <a:r>
                             <a:rPr lang="en-US" dirty="0"/>
-                            <a:t>0.72</a:t>
+                            <a:t>0.70</a:t>
                           </a:r>
                         </a:p>
                       </a:txBody>

</xml_diff>